<commit_message>
how to choose auxilliary number
</commit_message>
<xml_diff>
--- a/pp/2018-10-01-27-b.pptx
+++ b/pp/2018-10-01-27-b.pptx
@@ -8,6 +8,13 @@
     <p:sldId id="256" r:id="rId2"/>
     <p:sldId id="257" r:id="rId3"/>
     <p:sldId id="258" r:id="rId4"/>
+    <p:sldId id="259" r:id="rId5"/>
+    <p:sldId id="260" r:id="rId6"/>
+    <p:sldId id="261" r:id="rId7"/>
+    <p:sldId id="262" r:id="rId8"/>
+    <p:sldId id="263" r:id="rId9"/>
+    <p:sldId id="264" r:id="rId10"/>
+    <p:sldId id="265" r:id="rId11"/>
   </p:sldIdLst>
   <p:sldSz cx="12192000" cy="6858000"/>
   <p:notesSz cx="6858000" cy="9144000"/>
@@ -3443,6 +3450,98 @@
 </p:sld>
 </file>
 
+<file path=ppt/slides/slide10.xml><?xml version="1.0" encoding="utf-8"?>
+<p:sld xmlns:a="http://schemas.openxmlformats.org/drawingml/2006/main" xmlns:r="http://schemas.openxmlformats.org/officeDocument/2006/relationships" xmlns:p="http://schemas.openxmlformats.org/presentationml/2006/main">
+  <p:cSld>
+    <p:spTree>
+      <p:nvGrpSpPr>
+        <p:cNvPr id="1" name=""/>
+        <p:cNvGrpSpPr/>
+        <p:nvPr/>
+      </p:nvGrpSpPr>
+      <p:grpSpPr>
+        <a:xfrm>
+          <a:off x="0" y="0"/>
+          <a:ext cx="0" cy="0"/>
+          <a:chOff x="0" y="0"/>
+          <a:chExt cx="0" cy="0"/>
+        </a:xfrm>
+      </p:grpSpPr>
+      <p:sp>
+        <p:nvSpPr>
+          <p:cNvPr id="2" name="Title 1">
+            <a:extLst>
+              <a:ext uri="{FF2B5EF4-FFF2-40B4-BE49-F238E27FC236}">
+                <a16:creationId xmlns:a16="http://schemas.microsoft.com/office/drawing/2014/main" id="{0F6F1513-481C-4B74-B87E-6BC60A8B95BB}"/>
+              </a:ext>
+            </a:extLst>
+          </p:cNvPr>
+          <p:cNvSpPr>
+            <a:spLocks noGrp="1"/>
+          </p:cNvSpPr>
+          <p:nvPr>
+            <p:ph type="title"/>
+          </p:nvPr>
+        </p:nvSpPr>
+        <p:spPr/>
+        <p:txBody>
+          <a:bodyPr/>
+          <a:lstStyle/>
+          <a:p>
+            <a:r>
+              <a:rPr lang="ru-RU" dirty="0"/>
+              <a:t>Как выбрать запасное число?</a:t>
+            </a:r>
+          </a:p>
+        </p:txBody>
+      </p:sp>
+      <p:sp>
+        <p:nvSpPr>
+          <p:cNvPr id="3" name="Content Placeholder 2">
+            <a:extLst>
+              <a:ext uri="{FF2B5EF4-FFF2-40B4-BE49-F238E27FC236}">
+                <a16:creationId xmlns:a16="http://schemas.microsoft.com/office/drawing/2014/main" id="{897B9369-182D-4172-A347-03E146F48343}"/>
+              </a:ext>
+            </a:extLst>
+          </p:cNvPr>
+          <p:cNvSpPr>
+            <a:spLocks noGrp="1"/>
+          </p:cNvSpPr>
+          <p:nvPr>
+            <p:ph idx="1"/>
+          </p:nvPr>
+        </p:nvSpPr>
+        <p:spPr/>
+        <p:txBody>
+          <a:bodyPr/>
+          <a:lstStyle/>
+          <a:p>
+            <a:r>
+              <a:rPr lang="ru-RU" dirty="0"/>
+              <a:t>Кстати, нам нужно только одно запасное число. </a:t>
+            </a:r>
+          </a:p>
+          <a:p>
+            <a:r>
+              <a:rPr lang="ru-RU" dirty="0"/>
+              <a:t>Значит мы можем изучать каждую тройку, вычислять разницу между максимальным числом и двумя другими и запоминать всего одно число – минимальную встретившуюся разницу</a:t>
+            </a:r>
+          </a:p>
+        </p:txBody>
+      </p:sp>
+    </p:spTree>
+    <p:extLst>
+      <p:ext uri="{BB962C8B-B14F-4D97-AF65-F5344CB8AC3E}">
+        <p14:creationId xmlns:p14="http://schemas.microsoft.com/office/powerpoint/2010/main" val="3819546392"/>
+      </p:ext>
+    </p:extLst>
+  </p:cSld>
+  <p:clrMapOvr>
+    <a:masterClrMapping/>
+  </p:clrMapOvr>
+</p:sld>
+</file>
+
 <file path=ppt/slides/slide2.xml><?xml version="1.0" encoding="utf-8"?>
 <p:sld xmlns:a="http://schemas.openxmlformats.org/drawingml/2006/main" xmlns:r="http://schemas.openxmlformats.org/officeDocument/2006/relationships" xmlns:p="http://schemas.openxmlformats.org/presentationml/2006/main">
   <p:cSld>
@@ -3598,18 +3697,92 @@
         </p:nvSpPr>
         <p:spPr/>
         <p:txBody>
-          <a:bodyPr/>
+          <a:bodyPr>
+            <a:normAutofit fontScale="92500" lnSpcReduction="10000"/>
+          </a:bodyPr>
           <a:lstStyle/>
           <a:p>
             <a:r>
               <a:rPr lang="ru-RU" dirty="0"/>
-              <a:t>После формулировки задачи в тексте приводятся важные разъяснения об эффективности решения и формате входных данных. Обсудим критерии эффективности позднее. Сейчас важно, где мы будем </a:t>
-            </a:r>
-            <a:r>
-              <a:rPr lang="ru-RU"/>
-              <a:t>брать данные.</a:t>
-            </a:r>
-            <a:endParaRPr lang="ru-RU" dirty="0"/>
+              <a:t>После формулировки задачи в тексте приводятся важные разъяснения об эффективности решения и формате входных данных. Обсудим критерии эффективности позднее. Сейчас важно, где мы будем брать данные.</a:t>
+            </a:r>
+          </a:p>
+          <a:p>
+            <a:r>
+              <a:rPr lang="ru-RU" i="1" dirty="0"/>
+              <a:t>На вход программе подается в первой строке количество троек чисел </a:t>
+            </a:r>
+            <a:r>
+              <a:rPr lang="en-US" i="1" dirty="0"/>
+              <a:t>N</a:t>
+            </a:r>
+            <a:r>
+              <a:rPr lang="ru-RU" i="1" dirty="0"/>
+              <a:t> и каждая из следующих </a:t>
+            </a:r>
+            <a:r>
+              <a:rPr lang="en-US" i="1" dirty="0"/>
+              <a:t>N</a:t>
+            </a:r>
+            <a:r>
+              <a:rPr lang="ru-RU" i="1" dirty="0"/>
+              <a:t> строк содержит три натуральных числа не превышающих 10000.</a:t>
+            </a:r>
+          </a:p>
+          <a:p>
+            <a:r>
+              <a:rPr lang="ru-RU" dirty="0"/>
+              <a:t>Пример:</a:t>
+            </a:r>
+            <a:br>
+              <a:rPr lang="ru-RU" dirty="0"/>
+            </a:br>
+            <a:r>
+              <a:rPr lang="ru-RU" b="1" dirty="0">
+                <a:latin typeface="Courier New" panose="02070309020205020404" pitchFamily="49" charset="0"/>
+                <a:cs typeface="Courier New" panose="02070309020205020404" pitchFamily="49" charset="0"/>
+              </a:rPr>
+              <a:t>3</a:t>
+            </a:r>
+            <a:br>
+              <a:rPr lang="ru-RU" b="1" dirty="0">
+                <a:latin typeface="Courier New" panose="02070309020205020404" pitchFamily="49" charset="0"/>
+                <a:cs typeface="Courier New" panose="02070309020205020404" pitchFamily="49" charset="0"/>
+              </a:rPr>
+            </a:br>
+            <a:r>
+              <a:rPr lang="ru-RU" b="1" dirty="0">
+                <a:latin typeface="Courier New" panose="02070309020205020404" pitchFamily="49" charset="0"/>
+                <a:cs typeface="Courier New" panose="02070309020205020404" pitchFamily="49" charset="0"/>
+              </a:rPr>
+              <a:t>1 2 3</a:t>
+            </a:r>
+            <a:br>
+              <a:rPr lang="ru-RU" b="1" dirty="0">
+                <a:latin typeface="Courier New" panose="02070309020205020404" pitchFamily="49" charset="0"/>
+                <a:cs typeface="Courier New" panose="02070309020205020404" pitchFamily="49" charset="0"/>
+              </a:rPr>
+            </a:br>
+            <a:r>
+              <a:rPr lang="ru-RU" b="1" dirty="0">
+                <a:latin typeface="Courier New" panose="02070309020205020404" pitchFamily="49" charset="0"/>
+                <a:cs typeface="Courier New" panose="02070309020205020404" pitchFamily="49" charset="0"/>
+              </a:rPr>
+              <a:t>3 4 5</a:t>
+            </a:r>
+            <a:br>
+              <a:rPr lang="ru-RU" b="1" dirty="0">
+                <a:latin typeface="Courier New" panose="02070309020205020404" pitchFamily="49" charset="0"/>
+                <a:cs typeface="Courier New" panose="02070309020205020404" pitchFamily="49" charset="0"/>
+              </a:rPr>
+            </a:br>
+            <a:r>
+              <a:rPr lang="ru-RU" b="1" dirty="0">
+                <a:latin typeface="Courier New" panose="02070309020205020404" pitchFamily="49" charset="0"/>
+                <a:cs typeface="Courier New" panose="02070309020205020404" pitchFamily="49" charset="0"/>
+              </a:rPr>
+              <a:t>5 6 7</a:t>
+            </a:r>
           </a:p>
         </p:txBody>
       </p:sp>
@@ -3617,6 +3790,631 @@
     <p:extLst>
       <p:ext uri="{BB962C8B-B14F-4D97-AF65-F5344CB8AC3E}">
         <p14:creationId xmlns:p14="http://schemas.microsoft.com/office/powerpoint/2010/main" val="2608878193"/>
+      </p:ext>
+    </p:extLst>
+  </p:cSld>
+  <p:clrMapOvr>
+    <a:masterClrMapping/>
+  </p:clrMapOvr>
+</p:sld>
+</file>
+
+<file path=ppt/slides/slide4.xml><?xml version="1.0" encoding="utf-8"?>
+<p:sld xmlns:a="http://schemas.openxmlformats.org/drawingml/2006/main" xmlns:r="http://schemas.openxmlformats.org/officeDocument/2006/relationships" xmlns:p="http://schemas.openxmlformats.org/presentationml/2006/main">
+  <p:cSld>
+    <p:spTree>
+      <p:nvGrpSpPr>
+        <p:cNvPr id="1" name=""/>
+        <p:cNvGrpSpPr/>
+        <p:nvPr/>
+      </p:nvGrpSpPr>
+      <p:grpSpPr>
+        <a:xfrm>
+          <a:off x="0" y="0"/>
+          <a:ext cx="0" cy="0"/>
+          <a:chOff x="0" y="0"/>
+          <a:chExt cx="0" cy="0"/>
+        </a:xfrm>
+      </p:grpSpPr>
+      <p:sp>
+        <p:nvSpPr>
+          <p:cNvPr id="2" name="Title 1">
+            <a:extLst>
+              <a:ext uri="{FF2B5EF4-FFF2-40B4-BE49-F238E27FC236}">
+                <a16:creationId xmlns:a16="http://schemas.microsoft.com/office/drawing/2014/main" id="{4D272B0D-05BB-4709-AF9B-120FC8B46545}"/>
+              </a:ext>
+            </a:extLst>
+          </p:cNvPr>
+          <p:cNvSpPr>
+            <a:spLocks noGrp="1"/>
+          </p:cNvSpPr>
+          <p:nvPr>
+            <p:ph type="title"/>
+          </p:nvPr>
+        </p:nvSpPr>
+        <p:spPr/>
+        <p:txBody>
+          <a:bodyPr/>
+          <a:lstStyle/>
+          <a:p>
+            <a:r>
+              <a:rPr lang="ru-RU" dirty="0"/>
+              <a:t>Начнем</a:t>
+            </a:r>
+          </a:p>
+        </p:txBody>
+      </p:sp>
+      <p:sp>
+        <p:nvSpPr>
+          <p:cNvPr id="3" name="Content Placeholder 2">
+            <a:extLst>
+              <a:ext uri="{FF2B5EF4-FFF2-40B4-BE49-F238E27FC236}">
+                <a16:creationId xmlns:a16="http://schemas.microsoft.com/office/drawing/2014/main" id="{705446CF-0389-4113-B922-039B28E192A6}"/>
+              </a:ext>
+            </a:extLst>
+          </p:cNvPr>
+          <p:cNvSpPr>
+            <a:spLocks noGrp="1"/>
+          </p:cNvSpPr>
+          <p:nvPr>
+            <p:ph idx="1"/>
+          </p:nvPr>
+        </p:nvSpPr>
+        <p:spPr/>
+        <p:txBody>
+          <a:bodyPr/>
+          <a:lstStyle/>
+          <a:p>
+            <a:r>
+              <a:rPr lang="ru-RU" dirty="0"/>
+              <a:t>Для разминки попробуем решить задачу без дополнительного ограничения. Найдем максимальную сумму, которую можно получить выбирая по одному числу из каждой тройки.</a:t>
+            </a:r>
+          </a:p>
+          <a:p>
+            <a:r>
+              <a:rPr lang="ru-RU" dirty="0"/>
+              <a:t>Конечно, из каждой тройки мы будем брать максимальное число.</a:t>
+            </a:r>
+          </a:p>
+        </p:txBody>
+      </p:sp>
+    </p:spTree>
+    <p:extLst>
+      <p:ext uri="{BB962C8B-B14F-4D97-AF65-F5344CB8AC3E}">
+        <p14:creationId xmlns:p14="http://schemas.microsoft.com/office/powerpoint/2010/main" val="3721829089"/>
+      </p:ext>
+    </p:extLst>
+  </p:cSld>
+  <p:clrMapOvr>
+    <a:masterClrMapping/>
+  </p:clrMapOvr>
+</p:sld>
+</file>
+
+<file path=ppt/slides/slide5.xml><?xml version="1.0" encoding="utf-8"?>
+<p:sld xmlns:a="http://schemas.openxmlformats.org/drawingml/2006/main" xmlns:r="http://schemas.openxmlformats.org/officeDocument/2006/relationships" xmlns:p="http://schemas.openxmlformats.org/presentationml/2006/main">
+  <p:cSld>
+    <p:spTree>
+      <p:nvGrpSpPr>
+        <p:cNvPr id="1" name=""/>
+        <p:cNvGrpSpPr/>
+        <p:nvPr/>
+      </p:nvGrpSpPr>
+      <p:grpSpPr>
+        <a:xfrm>
+          <a:off x="0" y="0"/>
+          <a:ext cx="0" cy="0"/>
+          <a:chOff x="0" y="0"/>
+          <a:chExt cx="0" cy="0"/>
+        </a:xfrm>
+      </p:grpSpPr>
+      <p:sp>
+        <p:nvSpPr>
+          <p:cNvPr id="2" name="Title 1">
+            <a:extLst>
+              <a:ext uri="{FF2B5EF4-FFF2-40B4-BE49-F238E27FC236}">
+                <a16:creationId xmlns:a16="http://schemas.microsoft.com/office/drawing/2014/main" id="{98A709A9-2BED-415C-A344-38ECA2A57940}"/>
+              </a:ext>
+            </a:extLst>
+          </p:cNvPr>
+          <p:cNvSpPr>
+            <a:spLocks noGrp="1"/>
+          </p:cNvSpPr>
+          <p:nvPr>
+            <p:ph type="title"/>
+          </p:nvPr>
+        </p:nvSpPr>
+        <p:spPr/>
+        <p:txBody>
+          <a:bodyPr/>
+          <a:lstStyle/>
+          <a:p>
+            <a:r>
+              <a:rPr lang="ru-RU" dirty="0"/>
+              <a:t>Вариант решения упрощенной задачи</a:t>
+            </a:r>
+          </a:p>
+        </p:txBody>
+      </p:sp>
+      <p:pic>
+        <p:nvPicPr>
+          <p:cNvPr id="4" name="Content Placeholder 3">
+            <a:extLst>
+              <a:ext uri="{FF2B5EF4-FFF2-40B4-BE49-F238E27FC236}">
+                <a16:creationId xmlns:a16="http://schemas.microsoft.com/office/drawing/2014/main" id="{06878D23-A8BE-4136-A583-D3EB842E4114}"/>
+              </a:ext>
+            </a:extLst>
+          </p:cNvPr>
+          <p:cNvPicPr>
+            <a:picLocks noGrp="1" noChangeAspect="1"/>
+          </p:cNvPicPr>
+          <p:nvPr>
+            <p:ph idx="1"/>
+          </p:nvPr>
+        </p:nvPicPr>
+        <p:blipFill>
+          <a:blip r:embed="rId2"/>
+          <a:stretch>
+            <a:fillRect/>
+          </a:stretch>
+        </p:blipFill>
+        <p:spPr>
+          <a:xfrm>
+            <a:off x="2421568" y="1825625"/>
+            <a:ext cx="7348863" cy="4351338"/>
+          </a:xfrm>
+          <a:prstGeom prst="rect">
+            <a:avLst/>
+          </a:prstGeom>
+        </p:spPr>
+      </p:pic>
+    </p:spTree>
+    <p:extLst>
+      <p:ext uri="{BB962C8B-B14F-4D97-AF65-F5344CB8AC3E}">
+        <p14:creationId xmlns:p14="http://schemas.microsoft.com/office/powerpoint/2010/main" val="2391998941"/>
+      </p:ext>
+    </p:extLst>
+  </p:cSld>
+  <p:clrMapOvr>
+    <a:masterClrMapping/>
+  </p:clrMapOvr>
+</p:sld>
+</file>
+
+<file path=ppt/slides/slide6.xml><?xml version="1.0" encoding="utf-8"?>
+<p:sld xmlns:a="http://schemas.openxmlformats.org/drawingml/2006/main" xmlns:r="http://schemas.openxmlformats.org/officeDocument/2006/relationships" xmlns:p="http://schemas.openxmlformats.org/presentationml/2006/main">
+  <p:cSld>
+    <p:spTree>
+      <p:nvGrpSpPr>
+        <p:cNvPr id="1" name=""/>
+        <p:cNvGrpSpPr/>
+        <p:nvPr/>
+      </p:nvGrpSpPr>
+      <p:grpSpPr>
+        <a:xfrm>
+          <a:off x="0" y="0"/>
+          <a:ext cx="0" cy="0"/>
+          <a:chOff x="0" y="0"/>
+          <a:chExt cx="0" cy="0"/>
+        </a:xfrm>
+      </p:grpSpPr>
+      <p:sp>
+        <p:nvSpPr>
+          <p:cNvPr id="2" name="Title 1">
+            <a:extLst>
+              <a:ext uri="{FF2B5EF4-FFF2-40B4-BE49-F238E27FC236}">
+                <a16:creationId xmlns:a16="http://schemas.microsoft.com/office/drawing/2014/main" id="{4F9893FB-F840-4988-8F24-FE43C6CCD514}"/>
+              </a:ext>
+            </a:extLst>
+          </p:cNvPr>
+          <p:cNvSpPr>
+            <a:spLocks noGrp="1"/>
+          </p:cNvSpPr>
+          <p:nvPr>
+            <p:ph type="title"/>
+          </p:nvPr>
+        </p:nvSpPr>
+        <p:spPr/>
+        <p:txBody>
+          <a:bodyPr/>
+          <a:lstStyle/>
+          <a:p>
+            <a:r>
+              <a:rPr lang="ru-RU" dirty="0"/>
+              <a:t>Обсуждение варианта</a:t>
+            </a:r>
+          </a:p>
+        </p:txBody>
+      </p:sp>
+      <p:sp>
+        <p:nvSpPr>
+          <p:cNvPr id="3" name="Content Placeholder 2">
+            <a:extLst>
+              <a:ext uri="{FF2B5EF4-FFF2-40B4-BE49-F238E27FC236}">
+                <a16:creationId xmlns:a16="http://schemas.microsoft.com/office/drawing/2014/main" id="{A7D95FCA-896E-4C22-8FFA-B5DB861FDBD3}"/>
+              </a:ext>
+            </a:extLst>
+          </p:cNvPr>
+          <p:cNvSpPr>
+            <a:spLocks noGrp="1"/>
+          </p:cNvSpPr>
+          <p:nvPr>
+            <p:ph idx="1"/>
+          </p:nvPr>
+        </p:nvSpPr>
+        <p:spPr/>
+        <p:txBody>
+          <a:bodyPr/>
+          <a:lstStyle/>
+          <a:p>
+            <a:r>
+              <a:rPr lang="ru-RU" dirty="0"/>
+              <a:t>В строке 12 мы получаем из входных данных количество троек</a:t>
+            </a:r>
+          </a:p>
+          <a:p>
+            <a:r>
+              <a:rPr lang="ru-RU" dirty="0"/>
+              <a:t>В строке 16 мы накапливаем сумму по мере ввода данных</a:t>
+            </a:r>
+          </a:p>
+          <a:p>
+            <a:pPr lvl="1"/>
+            <a:r>
+              <a:rPr lang="ru-RU" dirty="0"/>
+              <a:t>Метод </a:t>
+            </a:r>
+            <a:r>
+              <a:rPr lang="en-US" dirty="0" err="1"/>
+              <a:t>MaxOfTriplet</a:t>
+            </a:r>
+            <a:r>
+              <a:rPr lang="ru-RU" dirty="0"/>
+              <a:t> извлекает из очередной строки три числа и выбирает из них максимальное.</a:t>
+            </a:r>
+          </a:p>
+          <a:p>
+            <a:r>
+              <a:rPr lang="ru-RU" dirty="0"/>
+              <a:t>После окончания цикла мы выводим результат и, если нам повезло, то сумма не делится на три и задача решена.</a:t>
+            </a:r>
+          </a:p>
+        </p:txBody>
+      </p:sp>
+    </p:spTree>
+    <p:extLst>
+      <p:ext uri="{BB962C8B-B14F-4D97-AF65-F5344CB8AC3E}">
+        <p14:creationId xmlns:p14="http://schemas.microsoft.com/office/powerpoint/2010/main" val="1761783636"/>
+      </p:ext>
+    </p:extLst>
+  </p:cSld>
+  <p:clrMapOvr>
+    <a:masterClrMapping/>
+  </p:clrMapOvr>
+</p:sld>
+</file>
+
+<file path=ppt/slides/slide7.xml><?xml version="1.0" encoding="utf-8"?>
+<p:sld xmlns:a="http://schemas.openxmlformats.org/drawingml/2006/main" xmlns:r="http://schemas.openxmlformats.org/officeDocument/2006/relationships" xmlns:p="http://schemas.openxmlformats.org/presentationml/2006/main">
+  <p:cSld>
+    <p:spTree>
+      <p:nvGrpSpPr>
+        <p:cNvPr id="1" name=""/>
+        <p:cNvGrpSpPr/>
+        <p:nvPr/>
+      </p:nvGrpSpPr>
+      <p:grpSpPr>
+        <a:xfrm>
+          <a:off x="0" y="0"/>
+          <a:ext cx="0" cy="0"/>
+          <a:chOff x="0" y="0"/>
+          <a:chExt cx="0" cy="0"/>
+        </a:xfrm>
+      </p:grpSpPr>
+      <p:sp>
+        <p:nvSpPr>
+          <p:cNvPr id="2" name="Title 1">
+            <a:extLst>
+              <a:ext uri="{FF2B5EF4-FFF2-40B4-BE49-F238E27FC236}">
+                <a16:creationId xmlns:a16="http://schemas.microsoft.com/office/drawing/2014/main" id="{7C9D4636-B0E6-4939-800A-C0DD2A5CF284}"/>
+              </a:ext>
+            </a:extLst>
+          </p:cNvPr>
+          <p:cNvSpPr>
+            <a:spLocks noGrp="1"/>
+          </p:cNvSpPr>
+          <p:nvPr>
+            <p:ph type="title"/>
+          </p:nvPr>
+        </p:nvSpPr>
+        <p:spPr/>
+        <p:txBody>
+          <a:bodyPr/>
+          <a:lstStyle/>
+          <a:p>
+            <a:r>
+              <a:rPr lang="ru-RU" dirty="0"/>
+              <a:t>Что делать если сумма кратна трем</a:t>
+            </a:r>
+          </a:p>
+        </p:txBody>
+      </p:sp>
+      <p:sp>
+        <p:nvSpPr>
+          <p:cNvPr id="3" name="Content Placeholder 2">
+            <a:extLst>
+              <a:ext uri="{FF2B5EF4-FFF2-40B4-BE49-F238E27FC236}">
+                <a16:creationId xmlns:a16="http://schemas.microsoft.com/office/drawing/2014/main" id="{8F8A32F1-C948-4A1F-A776-AECF9F03B78E}"/>
+              </a:ext>
+            </a:extLst>
+          </p:cNvPr>
+          <p:cNvSpPr>
+            <a:spLocks noGrp="1"/>
+          </p:cNvSpPr>
+          <p:nvPr>
+            <p:ph idx="1"/>
+          </p:nvPr>
+        </p:nvSpPr>
+        <p:spPr/>
+        <p:txBody>
+          <a:bodyPr/>
+          <a:lstStyle/>
+          <a:p>
+            <a:r>
+              <a:rPr lang="ru-RU" dirty="0"/>
+              <a:t>В предыдущей версии программы мы брали максимальное значение из каждой тройки чисел.</a:t>
+            </a:r>
+          </a:p>
+          <a:p>
+            <a:r>
+              <a:rPr lang="ru-RU" dirty="0"/>
+              <a:t>Это позволило нам получить максимально возможную сумму.</a:t>
+            </a:r>
+          </a:p>
+          <a:p>
+            <a:r>
+              <a:rPr lang="ru-RU" dirty="0"/>
+              <a:t>К сожалению эта сумма нам не подходит, она кратна трем.</a:t>
+            </a:r>
+          </a:p>
+          <a:p>
+            <a:r>
+              <a:rPr lang="ru-RU" dirty="0"/>
+              <a:t>Придется вместо максимального числа, в одной из троек взять одно из оставшихся.</a:t>
+            </a:r>
+          </a:p>
+          <a:p>
+            <a:pPr marL="0" indent="0">
+              <a:buNone/>
+            </a:pPr>
+            <a:endParaRPr lang="ru-RU" dirty="0"/>
+          </a:p>
+        </p:txBody>
+      </p:sp>
+    </p:spTree>
+    <p:extLst>
+      <p:ext uri="{BB962C8B-B14F-4D97-AF65-F5344CB8AC3E}">
+        <p14:creationId xmlns:p14="http://schemas.microsoft.com/office/powerpoint/2010/main" val="4172679008"/>
+      </p:ext>
+    </p:extLst>
+  </p:cSld>
+  <p:clrMapOvr>
+    <a:masterClrMapping/>
+  </p:clrMapOvr>
+</p:sld>
+</file>
+
+<file path=ppt/slides/slide8.xml><?xml version="1.0" encoding="utf-8"?>
+<p:sld xmlns:a="http://schemas.openxmlformats.org/drawingml/2006/main" xmlns:r="http://schemas.openxmlformats.org/officeDocument/2006/relationships" xmlns:p="http://schemas.openxmlformats.org/presentationml/2006/main">
+  <p:cSld>
+    <p:spTree>
+      <p:nvGrpSpPr>
+        <p:cNvPr id="1" name=""/>
+        <p:cNvGrpSpPr/>
+        <p:nvPr/>
+      </p:nvGrpSpPr>
+      <p:grpSpPr>
+        <a:xfrm>
+          <a:off x="0" y="0"/>
+          <a:ext cx="0" cy="0"/>
+          <a:chOff x="0" y="0"/>
+          <a:chExt cx="0" cy="0"/>
+        </a:xfrm>
+      </p:grpSpPr>
+      <p:sp>
+        <p:nvSpPr>
+          <p:cNvPr id="2" name="Title 1">
+            <a:extLst>
+              <a:ext uri="{FF2B5EF4-FFF2-40B4-BE49-F238E27FC236}">
+                <a16:creationId xmlns:a16="http://schemas.microsoft.com/office/drawing/2014/main" id="{1FD665B5-7B41-4FED-8C73-6BED29A3FA85}"/>
+              </a:ext>
+            </a:extLst>
+          </p:cNvPr>
+          <p:cNvSpPr>
+            <a:spLocks noGrp="1"/>
+          </p:cNvSpPr>
+          <p:nvPr>
+            <p:ph type="title"/>
+          </p:nvPr>
+        </p:nvSpPr>
+        <p:spPr/>
+        <p:txBody>
+          <a:bodyPr/>
+          <a:lstStyle/>
+          <a:p>
+            <a:r>
+              <a:rPr lang="ru-RU" dirty="0"/>
+              <a:t>Как выбрать запасное число?</a:t>
+            </a:r>
+          </a:p>
+        </p:txBody>
+      </p:sp>
+      <p:sp>
+        <p:nvSpPr>
+          <p:cNvPr id="3" name="Content Placeholder 2">
+            <a:extLst>
+              <a:ext uri="{FF2B5EF4-FFF2-40B4-BE49-F238E27FC236}">
+                <a16:creationId xmlns:a16="http://schemas.microsoft.com/office/drawing/2014/main" id="{90A4E735-00E4-49FE-8751-21FD2FAF6B98}"/>
+              </a:ext>
+            </a:extLst>
+          </p:cNvPr>
+          <p:cNvSpPr>
+            <a:spLocks noGrp="1"/>
+          </p:cNvSpPr>
+          <p:nvPr>
+            <p:ph idx="1"/>
+          </p:nvPr>
+        </p:nvSpPr>
+        <p:spPr/>
+        <p:txBody>
+          <a:bodyPr/>
+          <a:lstStyle/>
+          <a:p>
+            <a:r>
+              <a:rPr lang="ru-RU" dirty="0"/>
+              <a:t>Из любой тройки чисел мы можем выбрать наибольшее число. Мы уже это сделали в первой версии программы.</a:t>
+            </a:r>
+          </a:p>
+          <a:p>
+            <a:r>
+              <a:rPr lang="ru-RU" dirty="0"/>
+              <a:t>Так же мы можем узнать на сколько это число больше двух других. Может ли это нам помочь?</a:t>
+            </a:r>
+          </a:p>
+          <a:p>
+            <a:r>
+              <a:rPr lang="ru-RU" dirty="0"/>
+              <a:t>Разница между самым большим числом в тройке и другими числами может быть кратна трем. Если мы заменим выбранное из этой тройки максимальное число на другое, не только мы не получим максимальную сумму, но и результат все еще будет делится на три.</a:t>
+            </a:r>
+          </a:p>
+        </p:txBody>
+      </p:sp>
+    </p:spTree>
+    <p:extLst>
+      <p:ext uri="{BB962C8B-B14F-4D97-AF65-F5344CB8AC3E}">
+        <p14:creationId xmlns:p14="http://schemas.microsoft.com/office/powerpoint/2010/main" val="2783994897"/>
+      </p:ext>
+    </p:extLst>
+  </p:cSld>
+  <p:clrMapOvr>
+    <a:masterClrMapping/>
+  </p:clrMapOvr>
+</p:sld>
+</file>
+
+<file path=ppt/slides/slide9.xml><?xml version="1.0" encoding="utf-8"?>
+<p:sld xmlns:a="http://schemas.openxmlformats.org/drawingml/2006/main" xmlns:r="http://schemas.openxmlformats.org/officeDocument/2006/relationships" xmlns:p="http://schemas.openxmlformats.org/presentationml/2006/main">
+  <p:cSld>
+    <p:spTree>
+      <p:nvGrpSpPr>
+        <p:cNvPr id="1" name=""/>
+        <p:cNvGrpSpPr/>
+        <p:nvPr/>
+      </p:nvGrpSpPr>
+      <p:grpSpPr>
+        <a:xfrm>
+          <a:off x="0" y="0"/>
+          <a:ext cx="0" cy="0"/>
+          <a:chOff x="0" y="0"/>
+          <a:chExt cx="0" cy="0"/>
+        </a:xfrm>
+      </p:grpSpPr>
+      <p:sp>
+        <p:nvSpPr>
+          <p:cNvPr id="2" name="Title 1">
+            <a:extLst>
+              <a:ext uri="{FF2B5EF4-FFF2-40B4-BE49-F238E27FC236}">
+                <a16:creationId xmlns:a16="http://schemas.microsoft.com/office/drawing/2014/main" id="{F819E38F-D004-4786-B16A-49B298615580}"/>
+              </a:ext>
+            </a:extLst>
+          </p:cNvPr>
+          <p:cNvSpPr>
+            <a:spLocks noGrp="1"/>
+          </p:cNvSpPr>
+          <p:nvPr>
+            <p:ph type="title"/>
+          </p:nvPr>
+        </p:nvSpPr>
+        <p:spPr/>
+        <p:txBody>
+          <a:bodyPr/>
+          <a:lstStyle/>
+          <a:p>
+            <a:r>
+              <a:rPr lang="ru-RU" dirty="0"/>
+              <a:t>Как выбрать запасное число?</a:t>
+            </a:r>
+          </a:p>
+        </p:txBody>
+      </p:sp>
+      <p:sp>
+        <p:nvSpPr>
+          <p:cNvPr id="3" name="Content Placeholder 2">
+            <a:extLst>
+              <a:ext uri="{FF2B5EF4-FFF2-40B4-BE49-F238E27FC236}">
+                <a16:creationId xmlns:a16="http://schemas.microsoft.com/office/drawing/2014/main" id="{8F7E5C53-C7E6-4C4D-A9AC-C1257B94538F}"/>
+              </a:ext>
+            </a:extLst>
+          </p:cNvPr>
+          <p:cNvSpPr>
+            <a:spLocks noGrp="1"/>
+          </p:cNvSpPr>
+          <p:nvPr>
+            <p:ph idx="1"/>
+          </p:nvPr>
+        </p:nvSpPr>
+        <p:spPr/>
+        <p:txBody>
+          <a:bodyPr/>
+          <a:lstStyle/>
+          <a:p>
+            <a:r>
+              <a:rPr lang="ru-RU" dirty="0"/>
+              <a:t>Значит нам нужно выбрать такую для запаса тройку, где разница между максимальным числом и следующим по величине не делится на три.</a:t>
+            </a:r>
+          </a:p>
+          <a:p>
+            <a:r>
+              <a:rPr lang="ru-RU" dirty="0"/>
+              <a:t>Действительно, если мы от числа вида </a:t>
+            </a:r>
+            <a:r>
+              <a:rPr lang="en-US" dirty="0"/>
+              <a:t>3*p</a:t>
+            </a:r>
+            <a:r>
+              <a:rPr lang="ru-RU" dirty="0"/>
+              <a:t> отнимем число вида </a:t>
+            </a:r>
+            <a:r>
+              <a:rPr lang="en-US" dirty="0"/>
+              <a:t>3*</a:t>
+            </a:r>
+            <a:r>
+              <a:rPr lang="en-US" dirty="0" err="1"/>
+              <a:t>q+r</a:t>
+            </a:r>
+            <a:r>
+              <a:rPr lang="ru-RU" dirty="0"/>
+              <a:t>, то результат не будет делится на 3 – остаток будет равен (3-</a:t>
+            </a:r>
+            <a:r>
+              <a:rPr lang="en-US" dirty="0"/>
+              <a:t>r)</a:t>
+            </a:r>
+          </a:p>
+          <a:p>
+            <a:r>
+              <a:rPr lang="ru-RU" dirty="0"/>
+              <a:t>Возможно, что в разных тройках разница между первым и следующим числом будет различной, и нам, чтобы решить задачу требуется такая тройка, где разница будет наименьшей.</a:t>
+            </a:r>
+          </a:p>
+        </p:txBody>
+      </p:sp>
+    </p:spTree>
+    <p:extLst>
+      <p:ext uri="{BB962C8B-B14F-4D97-AF65-F5344CB8AC3E}">
+        <p14:creationId xmlns:p14="http://schemas.microsoft.com/office/powerpoint/2010/main" val="2414734426"/>
       </p:ext>
     </p:extLst>
   </p:cSld>

</xml_diff>

<commit_message>
getting ready to change program to solve the full problem
</commit_message>
<xml_diff>
--- a/pp/2018-10-01-27-b.pptx
+++ b/pp/2018-10-01-27-b.pptx
@@ -3524,8 +3524,13 @@
           <a:p>
             <a:r>
               <a:rPr lang="ru-RU" dirty="0"/>
-              <a:t>Значит мы можем изучать каждую тройку, вычислять разницу между максимальным числом и двумя другими и запоминать всего одно число – минимальную встретившуюся разницу</a:t>
-            </a:r>
+              <a:t>Значит мы можем изучать каждую тройку, вычислять разницу между максимальным числом и двумя другими и запоминать всего одно число – минимальную встретившуюся разницу, которая не делится </a:t>
+            </a:r>
+            <a:r>
+              <a:rPr lang="ru-RU"/>
+              <a:t>на три</a:t>
+            </a:r>
+            <a:endParaRPr lang="ru-RU" dirty="0"/>
           </a:p>
         </p:txBody>
       </p:sp>

</xml_diff>